<commit_message>
update Presentation LoOPS francais
</commit_message>
<xml_diff>
--- a/presentations/PrésentationLoOPSFrançais.pptx
+++ b/presentations/PrésentationLoOPSFrançais.pptx
@@ -199,7 +199,7 @@
           <a:p>
             <a:fld id="{99734DAD-B8A5-CA4D-AB71-C93C2527309C}" type="datetimeFigureOut">
               <a:rPr lang="fr-FR" smtClean="0"/>
-              <a:t>05/11/15</a:t>
+              <a:t>16/11/16</a:t>
             </a:fld>
             <a:endParaRPr lang="fr-FR"/>
           </a:p>
@@ -365,7 +365,7 @@
           <a:p>
             <a:fld id="{D50D922F-5A0C-8640-8E2E-DF9344F4008A}" type="datetimeFigureOut">
               <a:rPr lang="fr-FR" smtClean="0"/>
-              <a:t>05/11/15</a:t>
+              <a:t>16/11/16</a:t>
             </a:fld>
             <a:endParaRPr lang="fr-FR"/>
           </a:p>
@@ -819,6 +819,10 @@
           <a:bodyPr/>
           <a:lstStyle/>
           <a:p>
+            <a:r>
+              <a:rPr lang="fr-FR" smtClean="0"/>
+              <a:t>16/11/2016</a:t>
+            </a:r>
             <a:endParaRPr lang="fr-FR"/>
           </a:p>
         </p:txBody>
@@ -1005,6 +1009,10 @@
           <a:bodyPr/>
           <a:lstStyle/>
           <a:p>
+            <a:r>
+              <a:rPr lang="fr-FR" smtClean="0"/>
+              <a:t>16/11/2016</a:t>
+            </a:r>
             <a:endParaRPr lang="fr-FR"/>
           </a:p>
         </p:txBody>
@@ -1191,6 +1199,10 @@
           <a:bodyPr/>
           <a:lstStyle/>
           <a:p>
+            <a:r>
+              <a:rPr lang="fr-FR" smtClean="0"/>
+              <a:t>16/11/2016</a:t>
+            </a:r>
             <a:endParaRPr lang="fr-FR"/>
           </a:p>
         </p:txBody>
@@ -1377,6 +1389,10 @@
           <a:bodyPr/>
           <a:lstStyle/>
           <a:p>
+            <a:r>
+              <a:rPr lang="fr-FR" smtClean="0"/>
+              <a:t>16/11/2016</a:t>
+            </a:r>
             <a:endParaRPr lang="fr-FR"/>
           </a:p>
         </p:txBody>
@@ -1629,6 +1645,10 @@
           <a:bodyPr/>
           <a:lstStyle/>
           <a:p>
+            <a:r>
+              <a:rPr lang="fr-FR" smtClean="0"/>
+              <a:t>16/11/2016</a:t>
+            </a:r>
             <a:endParaRPr lang="fr-FR"/>
           </a:p>
         </p:txBody>
@@ -1931,6 +1951,10 @@
           <a:bodyPr/>
           <a:lstStyle/>
           <a:p>
+            <a:r>
+              <a:rPr lang="fr-FR" smtClean="0"/>
+              <a:t>16/11/2016</a:t>
+            </a:r>
             <a:endParaRPr lang="fr-FR"/>
           </a:p>
         </p:txBody>
@@ -2373,6 +2397,10 @@
           <a:bodyPr/>
           <a:lstStyle/>
           <a:p>
+            <a:r>
+              <a:rPr lang="fr-FR" smtClean="0"/>
+              <a:t>16/11/2016</a:t>
+            </a:r>
             <a:endParaRPr lang="fr-FR"/>
           </a:p>
         </p:txBody>
@@ -2499,6 +2527,10 @@
           <a:bodyPr/>
           <a:lstStyle/>
           <a:p>
+            <a:r>
+              <a:rPr lang="fr-FR" smtClean="0"/>
+              <a:t>16/11/2016</a:t>
+            </a:r>
             <a:endParaRPr lang="fr-FR"/>
           </a:p>
         </p:txBody>
@@ -2594,6 +2626,10 @@
           <a:bodyPr/>
           <a:lstStyle/>
           <a:p>
+            <a:r>
+              <a:rPr lang="fr-FR" smtClean="0"/>
+              <a:t>16/11/2016</a:t>
+            </a:r>
             <a:endParaRPr lang="fr-FR"/>
           </a:p>
         </p:txBody>
@@ -2880,6 +2916,10 @@
           <a:bodyPr/>
           <a:lstStyle/>
           <a:p>
+            <a:r>
+              <a:rPr lang="fr-FR" smtClean="0"/>
+              <a:t>16/11/2016</a:t>
+            </a:r>
             <a:endParaRPr lang="fr-FR"/>
           </a:p>
         </p:txBody>
@@ -3142,6 +3182,10 @@
           <a:bodyPr/>
           <a:lstStyle/>
           <a:p>
+            <a:r>
+              <a:rPr lang="fr-FR" smtClean="0"/>
+              <a:t>16/11/2016</a:t>
+            </a:r>
             <a:endParaRPr lang="fr-FR"/>
           </a:p>
         </p:txBody>
@@ -3314,6 +3358,10 @@
             </a:lvl1pPr>
           </a:lstStyle>
           <a:p>
+            <a:r>
+              <a:rPr lang="fr-FR" smtClean="0"/>
+              <a:t>16/11/2016</a:t>
+            </a:r>
             <a:endParaRPr lang="fr-FR" dirty="0"/>
           </a:p>
         </p:txBody>
@@ -4177,6 +4225,10 @@
           <a:bodyPr/>
           <a:lstStyle/>
           <a:p>
+            <a:r>
+              <a:rPr lang="fr-FR" smtClean="0"/>
+              <a:t>16/11/2016</a:t>
+            </a:r>
             <a:endParaRPr lang="fr-FR"/>
           </a:p>
         </p:txBody>
@@ -4507,7 +4559,11 @@
           <a:p>
             <a:r>
               <a:rPr lang="fr-FR" dirty="0" smtClean="0"/>
-              <a:t>151 membres</a:t>
+              <a:t>206 </a:t>
+            </a:r>
+            <a:r>
+              <a:rPr lang="fr-FR" dirty="0" smtClean="0"/>
+              <a:t>membres</a:t>
             </a:r>
           </a:p>
           <a:p>
@@ -4727,6 +4783,10 @@
           <a:bodyPr/>
           <a:lstStyle/>
           <a:p>
+            <a:r>
+              <a:rPr lang="fr-FR" smtClean="0"/>
+              <a:t>16/11/2016</a:t>
+            </a:r>
             <a:endParaRPr lang="fr-FR"/>
           </a:p>
         </p:txBody>
@@ -4818,11 +4878,7 @@
             </a:pPr>
             <a:r>
               <a:rPr lang="is-IS" dirty="0" smtClean="0"/>
-              <a:t>►</a:t>
-            </a:r>
-            <a:r>
-              <a:rPr lang="is-IS" dirty="0" smtClean="0"/>
-              <a:t>	</a:t>
+              <a:t>►	</a:t>
             </a:r>
             <a:r>
               <a:rPr lang="fr-FR" dirty="0" smtClean="0">
@@ -4863,7 +4919,11 @@
             <a:pPr lvl="2"/>
             <a:r>
               <a:rPr lang="fr-FR" dirty="0" smtClean="0"/>
-              <a:t>7 journées </a:t>
+              <a:t>11 </a:t>
+            </a:r>
+            <a:r>
+              <a:rPr lang="fr-FR" dirty="0" smtClean="0"/>
+              <a:t>journées </a:t>
             </a:r>
             <a:r>
               <a:rPr lang="fr-FR" dirty="0" err="1" smtClean="0"/>
@@ -4871,15 +4931,7 @@
             </a:r>
             <a:r>
               <a:rPr lang="fr-FR" dirty="0" smtClean="0"/>
-              <a:t> </a:t>
-            </a:r>
-            <a:r>
-              <a:rPr lang="fr-FR" dirty="0" smtClean="0"/>
-              <a:t>depuis </a:t>
-            </a:r>
-            <a:r>
-              <a:rPr lang="fr-FR" dirty="0" smtClean="0"/>
-              <a:t>mai 2012 (présentations, ateliers, </a:t>
+              <a:t> depuis mai 2012 (présentations, ateliers, </a:t>
             </a:r>
             <a:r>
               <a:rPr lang="fr-FR" dirty="0" err="1" smtClean="0"/>
@@ -5102,6 +5154,10 @@
           <a:bodyPr/>
           <a:lstStyle/>
           <a:p>
+            <a:r>
+              <a:rPr lang="fr-FR" smtClean="0"/>
+              <a:t>16/11/2016</a:t>
+            </a:r>
             <a:endParaRPr lang="fr-FR"/>
           </a:p>
         </p:txBody>
@@ -5346,32 +5402,21 @@
             </a:pPr>
             <a:r>
               <a:rPr lang="fr-FR" sz="2200" dirty="0" smtClean="0"/>
-              <a:t>8</a:t>
-            </a:r>
-            <a:r>
-              <a:rPr lang="fr-FR" sz="2200" baseline="30000" dirty="0" smtClean="0"/>
-              <a:t>ième</a:t>
+              <a:t>A venir : </a:t>
+            </a:r>
+            <a:r>
+              <a:rPr lang="fr-FR" sz="2200" b="1" dirty="0" err="1" smtClean="0"/>
+              <a:t>JupyterDay</a:t>
+            </a:r>
+            <a:r>
+              <a:rPr lang="fr-FR" sz="2200" b="1" dirty="0" smtClean="0"/>
+              <a:t> </a:t>
             </a:r>
             <a:r>
               <a:rPr lang="fr-FR" sz="2200" dirty="0" smtClean="0"/>
-              <a:t> journée </a:t>
-            </a:r>
-            <a:r>
-              <a:rPr lang="fr-FR" sz="2200" dirty="0" err="1" smtClean="0"/>
-              <a:t>LoOPS</a:t>
-            </a:r>
-            <a:r>
-              <a:rPr lang="fr-FR" sz="2200" dirty="0" smtClean="0"/>
-              <a:t> le 17 décembre Docker et </a:t>
-            </a:r>
-            <a:r>
-              <a:rPr lang="fr-FR" sz="2200" dirty="0" err="1" smtClean="0"/>
-              <a:t>Unikernel</a:t>
-            </a:r>
-            <a:r>
-              <a:rPr lang="fr-FR" sz="2200" dirty="0" smtClean="0"/>
-              <a:t> sont sur un bateau. Proto 204</a:t>
-            </a:r>
+              <a:t>à l’IAS ORSAY et au Proto204 le 6 décembre</a:t>
+            </a:r>
+            <a:endParaRPr lang="fr-FR" sz="2200" dirty="0" smtClean="0"/>
           </a:p>
           <a:p>
             <a:pPr marL="0" indent="0">
@@ -5394,46 +5439,9 @@
             </a:pPr>
             <a:r>
               <a:rPr lang="fr-FR" sz="2200" dirty="0" smtClean="0"/>
-              <a:t>GPU </a:t>
-            </a:r>
-            <a:r>
-              <a:rPr lang="fr-FR" sz="2200" dirty="0" err="1" smtClean="0"/>
-              <a:t>day</a:t>
-            </a:r>
-            <a:r>
-              <a:rPr lang="fr-FR" sz="2200" dirty="0" smtClean="0"/>
-              <a:t> in 2016 (first </a:t>
-            </a:r>
-            <a:r>
-              <a:rPr lang="fr-FR" sz="2200" dirty="0" err="1" smtClean="0"/>
-              <a:t>semester</a:t>
-            </a:r>
-            <a:r>
-              <a:rPr lang="fr-FR" sz="2200" dirty="0" smtClean="0"/>
-              <a:t>)</a:t>
-            </a:r>
-          </a:p>
-          <a:p>
-            <a:pPr marL="0" indent="0">
-              <a:buNone/>
-            </a:pPr>
-            <a:r>
-              <a:rPr lang="fr-FR" sz="2200" dirty="0" err="1"/>
-              <a:t>Hadoops</a:t>
-            </a:r>
-            <a:r>
-              <a:rPr lang="fr-FR" sz="2200" dirty="0"/>
-              <a:t> / </a:t>
-            </a:r>
-            <a:r>
-              <a:rPr lang="fr-FR" sz="2200" dirty="0" err="1" smtClean="0"/>
-              <a:t>Spark</a:t>
-            </a:r>
-            <a:r>
-              <a:rPr lang="fr-FR" sz="2200" dirty="0" smtClean="0"/>
-              <a:t> </a:t>
-            </a:r>
-            <a:endParaRPr lang="fr-FR" sz="2200" dirty="0"/>
+              <a:t>Journée Intégration Continue</a:t>
+            </a:r>
+            <a:endParaRPr lang="fr-FR" sz="2200" dirty="0" smtClean="0"/>
           </a:p>
           <a:p>
             <a:pPr marL="0" indent="0">
@@ -5627,6 +5635,10 @@
           <a:bodyPr/>
           <a:lstStyle/>
           <a:p>
+            <a:r>
+              <a:rPr lang="fr-FR" smtClean="0"/>
+              <a:t>16/11/2016</a:t>
+            </a:r>
             <a:endParaRPr lang="fr-FR"/>
           </a:p>
         </p:txBody>

</xml_diff>